<commit_message>
matthias photo from linkedin
</commit_message>
<xml_diff>
--- a/2ndpresentation.pptx
+++ b/2ndpresentation.pptx
@@ -3756,7 +3756,7 @@
           <a:graphicData uri="http://schemas.openxmlformats.org/presentationml/2006/ole">
             <mc:AlternateContent xmlns:mc="http://schemas.openxmlformats.org/markup-compatibility/2006">
               <mc:Choice xmlns:v="urn:schemas-microsoft-com:vml" Requires="v">
-                <p:oleObj spid="_x0000_s1031" name="think-cell Folie" r:id="rId13" imgW="270" imgH="270" progId="TCLayout.ActiveDocument.1">
+                <p:oleObj spid="_x0000_s1034" name="think-cell Folie" r:id="rId13" imgW="270" imgH="270" progId="TCLayout.ActiveDocument.1">
                   <p:embed/>
                 </p:oleObj>
               </mc:Choice>
@@ -5103,8 +5103,17 @@
                 </a:solidFill>
                 <a:latin typeface="Franklin Gothic Heavy" panose="020B0903020102020204" pitchFamily="34" charset="0"/>
               </a:rPr>
-              <a:t>David . M.</a:t>
+              <a:t>David  M.</a:t>
             </a:r>
+            <a:endParaRPr lang="en-US" dirty="0" smtClean="0">
+              <a:solidFill>
+                <a:schemeClr val="tx1">
+                  <a:lumMod val="85000"/>
+                  <a:lumOff val="15000"/>
+                </a:schemeClr>
+              </a:solidFill>
+              <a:latin typeface="Franklin Gothic Heavy" panose="020B0903020102020204" pitchFamily="34" charset="0"/>
+            </a:endParaRPr>
           </a:p>
           <a:p>
             <a:r>
@@ -5491,38 +5500,34 @@
           </p:cNvPicPr>
           <p:nvPr/>
         </p:nvPicPr>
-        <p:blipFill rotWithShape="1">
-          <a:blip r:embed="rId5">
+        <p:blipFill>
+          <a:blip r:embed="rId11">
+            <a:duotone>
+              <a:prstClr val="black"/>
+              <a:schemeClr val="tx2">
+                <a:tint val="45000"/>
+                <a:satMod val="400000"/>
+              </a:schemeClr>
+            </a:duotone>
             <a:extLst>
-              <a:ext uri="{BEBA8EAE-BF5A-486C-A8C5-ECC9F3942E4B}">
-                <a14:imgProps xmlns:a14="http://schemas.microsoft.com/office/drawing/2010/main">
-                  <a14:imgLayer r:embed="rId6">
-                    <a14:imgEffect>
-                      <a14:saturation sat="0"/>
-                    </a14:imgEffect>
-                  </a14:imgLayer>
-                </a14:imgProps>
-              </a:ext>
               <a:ext uri="{28A0092B-C50C-407E-A947-70E740481C1C}">
                 <a14:useLocalDpi xmlns:a14="http://schemas.microsoft.com/office/drawing/2010/main" val="0"/>
               </a:ext>
             </a:extLst>
           </a:blip>
-          <a:srcRect l="25538" t="1666" r="20194" b="47020"/>
-          <a:stretch/>
+          <a:stretch>
+            <a:fillRect/>
+          </a:stretch>
         </p:blipFill>
         <p:spPr>
           <a:xfrm>
-            <a:off x="7316196" y="1704650"/>
-            <a:ext cx="1446804" cy="1386775"/>
+            <a:off x="7346210" y="1704650"/>
+            <a:ext cx="1386775" cy="1386775"/>
           </a:xfrm>
           <a:prstGeom prst="rect">
             <a:avLst/>
           </a:prstGeom>
-          <a:ln>
-            <a:noFill/>
-          </a:ln>
-          <a:effectLst/>
+          <a:noFill/>
         </p:spPr>
       </p:pic>
       <p:sp>
@@ -6634,7 +6639,7 @@
           <a:graphicData uri="http://schemas.openxmlformats.org/presentationml/2006/ole">
             <mc:AlternateContent xmlns:mc="http://schemas.openxmlformats.org/markup-compatibility/2006">
               <mc:Choice xmlns:v="urn:schemas-microsoft-com:vml" Requires="v">
-                <p:oleObj spid="_x0000_s2058" name="think-cell Folie" r:id="rId5" imgW="270" imgH="270" progId="TCLayout.ActiveDocument.1">
+                <p:oleObj spid="_x0000_s2061" name="think-cell Folie" r:id="rId5" imgW="270" imgH="270" progId="TCLayout.ActiveDocument.1">
                   <p:embed/>
                 </p:oleObj>
               </mc:Choice>

</xml_diff>

<commit_message>
changes in the layers of pictures
</commit_message>
<xml_diff>
--- a/2ndpresentation.pptx
+++ b/2ndpresentation.pptx
@@ -380,7 +380,7 @@
             <a:fld id="{A8ADFD5B-A66C-449C-B6E8-FB716D07777D}" type="datetimeFigureOut">
               <a:rPr lang="en-US" smtClean="0"/>
               <a:pPr/>
-              <a:t>4/13/2015</a:t>
+              <a:t>4/14/2015</a:t>
             </a:fld>
             <a:endParaRPr lang="en-US"/>
           </a:p>
@@ -1419,7 +1419,7 @@
                 </a:solidFill>
               </a:rPr>
               <a:pPr algn="ctr"/>
-              <a:t>4/13/2015</a:t>
+              <a:t>4/14/2015</a:t>
             </a:fld>
             <a:endParaRPr lang="en-US" sz="2000" dirty="0">
               <a:solidFill>
@@ -1616,7 +1616,7 @@
             <a:fld id="{E4606EA6-EFEA-4C30-9264-4F9291A5780D}" type="datetime1">
               <a:rPr lang="en-US" smtClean="0"/>
               <a:pPr/>
-              <a:t>4/13/2015</a:t>
+              <a:t>4/14/2015</a:t>
             </a:fld>
             <a:endParaRPr lang="en-US"/>
           </a:p>
@@ -2047,7 +2047,7 @@
             <a:fld id="{6FCF9F07-3BC7-4570-B054-79111B0A380C}" type="datetime1">
               <a:rPr lang="en-US" smtClean="0"/>
               <a:pPr/>
-              <a:t>4/13/2015</a:t>
+              <a:t>4/14/2015</a:t>
             </a:fld>
             <a:endParaRPr lang="en-US"/>
           </a:p>
@@ -2311,7 +2311,7 @@
             <a:fld id="{E4606EA6-EFEA-4C30-9264-4F9291A5780D}" type="datetime1">
               <a:rPr lang="en-US" smtClean="0"/>
               <a:pPr/>
-              <a:t>4/13/2015</a:t>
+              <a:t>4/14/2015</a:t>
             </a:fld>
             <a:endParaRPr lang="en-US"/>
           </a:p>
@@ -2565,7 +2565,7 @@
             <a:fld id="{E4606EA6-EFEA-4C30-9264-4F9291A5780D}" type="datetime1">
               <a:rPr lang="en-US" smtClean="0"/>
               <a:pPr/>
-              <a:t>4/13/2015</a:t>
+              <a:t>4/14/2015</a:t>
             </a:fld>
             <a:endParaRPr lang="en-US"/>
           </a:p>
@@ -2777,7 +2777,7 @@
             <a:fld id="{6DFADB5D-B7A0-47E3-AD2D-B1A6F8614213}" type="datetime1">
               <a:rPr lang="en-US" smtClean="0"/>
               <a:pPr/>
-              <a:t>4/13/2015</a:t>
+              <a:t>4/14/2015</a:t>
             </a:fld>
             <a:endParaRPr lang="en-US"/>
           </a:p>
@@ -2890,7 +2890,7 @@
             <a:fld id="{72968126-03FC-49C0-B9B8-2B561CCC3D90}" type="datetime1">
               <a:rPr lang="en-US" smtClean="0"/>
               <a:pPr/>
-              <a:t>4/13/2015</a:t>
+              <a:t>4/14/2015</a:t>
             </a:fld>
             <a:endParaRPr lang="en-US"/>
           </a:p>
@@ -3042,7 +3042,7 @@
             <a:fld id="{F49A8198-4617-485E-9585-4840B69DBBA6}" type="datetime1">
               <a:rPr lang="en-US" smtClean="0"/>
               <a:pPr/>
-              <a:t>4/13/2015</a:t>
+              <a:t>4/14/2015</a:t>
             </a:fld>
             <a:endParaRPr lang="en-US"/>
           </a:p>
@@ -3630,7 +3630,7 @@
             <a:fld id="{E4606EA6-EFEA-4C30-9264-4F9291A5780D}" type="datetime1">
               <a:rPr lang="en-US" smtClean="0"/>
               <a:pPr/>
-              <a:t>4/13/2015</a:t>
+              <a:t>4/14/2015</a:t>
             </a:fld>
             <a:endParaRPr lang="en-US"/>
           </a:p>
@@ -3756,7 +3756,7 @@
           <a:graphicData uri="http://schemas.openxmlformats.org/presentationml/2006/ole">
             <mc:AlternateContent xmlns:mc="http://schemas.openxmlformats.org/markup-compatibility/2006">
               <mc:Choice xmlns:v="urn:schemas-microsoft-com:vml" Requires="v">
-                <p:oleObj spid="_x0000_s1034" name="think-cell Folie" r:id="rId13" imgW="270" imgH="270" progId="TCLayout.ActiveDocument.1">
+                <p:oleObj spid="_x0000_s1035" name="think-cell Folie" r:id="rId13" imgW="270" imgH="270" progId="TCLayout.ActiveDocument.1">
                   <p:embed/>
                 </p:oleObj>
               </mc:Choice>
@@ -3890,7 +3890,7 @@
             <a:fld id="{E4606EA6-EFEA-4C30-9264-4F9291A5780D}" type="datetime1">
               <a:rPr lang="en-US" smtClean="0"/>
               <a:pPr/>
-              <a:t>4/13/2015</a:t>
+              <a:t>4/14/2015</a:t>
             </a:fld>
             <a:endParaRPr lang="en-US" sz="1400" dirty="0">
               <a:solidFill>
@@ -5105,15 +5105,6 @@
               </a:rPr>
               <a:t>David  M.</a:t>
             </a:r>
-            <a:endParaRPr lang="en-US" dirty="0" smtClean="0">
-              <a:solidFill>
-                <a:schemeClr val="tx1">
-                  <a:lumMod val="85000"/>
-                  <a:lumOff val="15000"/>
-                </a:schemeClr>
-              </a:solidFill>
-              <a:latin typeface="Franklin Gothic Heavy" panose="020B0903020102020204" pitchFamily="34" charset="0"/>
-            </a:endParaRPr>
           </a:p>
           <a:p>
             <a:r>
@@ -6639,7 +6630,7 @@
           <a:graphicData uri="http://schemas.openxmlformats.org/presentationml/2006/ole">
             <mc:AlternateContent xmlns:mc="http://schemas.openxmlformats.org/markup-compatibility/2006">
               <mc:Choice xmlns:v="urn:schemas-microsoft-com:vml" Requires="v">
-                <p:oleObj spid="_x0000_s2061" name="think-cell Folie" r:id="rId5" imgW="270" imgH="270" progId="TCLayout.ActiveDocument.1">
+                <p:oleObj spid="_x0000_s2062" name="think-cell Folie" r:id="rId5" imgW="270" imgH="270" progId="TCLayout.ActiveDocument.1">
                   <p:embed/>
                 </p:oleObj>
               </mc:Choice>
@@ -7212,7 +7203,7 @@
           </p:cNvPicPr>
           <p:nvPr/>
         </p:nvPicPr>
-        <p:blipFill>
+        <p:blipFill rotWithShape="1">
           <a:blip r:embed="rId16" cstate="print">
             <a:extLst>
               <a:ext uri="{28A0092B-C50C-407E-A947-70E740481C1C}">
@@ -7220,14 +7211,13 @@
               </a:ext>
             </a:extLst>
           </a:blip>
-          <a:stretch>
-            <a:fillRect/>
-          </a:stretch>
+          <a:srcRect t="27386" b="32524"/>
+          <a:stretch/>
         </p:blipFill>
         <p:spPr>
           <a:xfrm>
-            <a:off x="4419600" y="0"/>
-            <a:ext cx="1276350" cy="1276350"/>
+            <a:off x="4419600" y="349537"/>
+            <a:ext cx="1276350" cy="511700"/>
           </a:xfrm>
           <a:prstGeom prst="rect">
             <a:avLst/>

</xml_diff>

<commit_message>
Matthias with 2 t and i'm just max
</commit_message>
<xml_diff>
--- a/2ndpresentation.pptx
+++ b/2ndpresentation.pptx
@@ -380,7 +380,7 @@
             <a:fld id="{A8ADFD5B-A66C-449C-B6E8-FB716D07777D}" type="datetimeFigureOut">
               <a:rPr lang="en-US" smtClean="0"/>
               <a:pPr/>
-              <a:t>4/14/2015</a:t>
+              <a:t>4/15/2015</a:t>
             </a:fld>
             <a:endParaRPr lang="en-US"/>
           </a:p>
@@ -1419,7 +1419,7 @@
                 </a:solidFill>
               </a:rPr>
               <a:pPr algn="ctr"/>
-              <a:t>4/14/2015</a:t>
+              <a:t>4/15/2015</a:t>
             </a:fld>
             <a:endParaRPr lang="en-US" sz="2000" dirty="0">
               <a:solidFill>
@@ -1616,7 +1616,7 @@
             <a:fld id="{E4606EA6-EFEA-4C30-9264-4F9291A5780D}" type="datetime1">
               <a:rPr lang="en-US" smtClean="0"/>
               <a:pPr/>
-              <a:t>4/14/2015</a:t>
+              <a:t>4/15/2015</a:t>
             </a:fld>
             <a:endParaRPr lang="en-US"/>
           </a:p>
@@ -2047,7 +2047,7 @@
             <a:fld id="{6FCF9F07-3BC7-4570-B054-79111B0A380C}" type="datetime1">
               <a:rPr lang="en-US" smtClean="0"/>
               <a:pPr/>
-              <a:t>4/14/2015</a:t>
+              <a:t>4/15/2015</a:t>
             </a:fld>
             <a:endParaRPr lang="en-US"/>
           </a:p>
@@ -2311,7 +2311,7 @@
             <a:fld id="{E4606EA6-EFEA-4C30-9264-4F9291A5780D}" type="datetime1">
               <a:rPr lang="en-US" smtClean="0"/>
               <a:pPr/>
-              <a:t>4/14/2015</a:t>
+              <a:t>4/15/2015</a:t>
             </a:fld>
             <a:endParaRPr lang="en-US"/>
           </a:p>
@@ -2565,7 +2565,7 @@
             <a:fld id="{E4606EA6-EFEA-4C30-9264-4F9291A5780D}" type="datetime1">
               <a:rPr lang="en-US" smtClean="0"/>
               <a:pPr/>
-              <a:t>4/14/2015</a:t>
+              <a:t>4/15/2015</a:t>
             </a:fld>
             <a:endParaRPr lang="en-US"/>
           </a:p>
@@ -2777,7 +2777,7 @@
             <a:fld id="{6DFADB5D-B7A0-47E3-AD2D-B1A6F8614213}" type="datetime1">
               <a:rPr lang="en-US" smtClean="0"/>
               <a:pPr/>
-              <a:t>4/14/2015</a:t>
+              <a:t>4/15/2015</a:t>
             </a:fld>
             <a:endParaRPr lang="en-US"/>
           </a:p>
@@ -2890,7 +2890,7 @@
             <a:fld id="{72968126-03FC-49C0-B9B8-2B561CCC3D90}" type="datetime1">
               <a:rPr lang="en-US" smtClean="0"/>
               <a:pPr/>
-              <a:t>4/14/2015</a:t>
+              <a:t>4/15/2015</a:t>
             </a:fld>
             <a:endParaRPr lang="en-US"/>
           </a:p>
@@ -3042,7 +3042,7 @@
             <a:fld id="{F49A8198-4617-485E-9585-4840B69DBBA6}" type="datetime1">
               <a:rPr lang="en-US" smtClean="0"/>
               <a:pPr/>
-              <a:t>4/14/2015</a:t>
+              <a:t>4/15/2015</a:t>
             </a:fld>
             <a:endParaRPr lang="en-US"/>
           </a:p>
@@ -3630,7 +3630,7 @@
             <a:fld id="{E4606EA6-EFEA-4C30-9264-4F9291A5780D}" type="datetime1">
               <a:rPr lang="en-US" smtClean="0"/>
               <a:pPr/>
-              <a:t>4/14/2015</a:t>
+              <a:t>4/15/2015</a:t>
             </a:fld>
             <a:endParaRPr lang="en-US"/>
           </a:p>
@@ -3756,7 +3756,7 @@
           <a:graphicData uri="http://schemas.openxmlformats.org/presentationml/2006/ole">
             <mc:AlternateContent xmlns:mc="http://schemas.openxmlformats.org/markup-compatibility/2006">
               <mc:Choice xmlns:v="urn:schemas-microsoft-com:vml" Requires="v">
-                <p:oleObj spid="_x0000_s1035" name="think-cell Folie" r:id="rId13" imgW="270" imgH="270" progId="TCLayout.ActiveDocument.1">
+                <p:oleObj spid="_x0000_s1036" name="think-cell Folie" r:id="rId13" imgW="270" imgH="270" progId="TCLayout.ActiveDocument.1">
                   <p:embed/>
                 </p:oleObj>
               </mc:Choice>
@@ -3890,7 +3890,7 @@
             <a:fld id="{E4606EA6-EFEA-4C30-9264-4F9291A5780D}" type="datetime1">
               <a:rPr lang="en-US" smtClean="0"/>
               <a:pPr/>
-              <a:t>4/14/2015</a:t>
+              <a:t>4/15/2015</a:t>
             </a:fld>
             <a:endParaRPr lang="en-US" sz="1400" dirty="0">
               <a:solidFill>
@@ -5103,8 +5103,17 @@
                 </a:solidFill>
                 <a:latin typeface="Franklin Gothic Heavy" panose="020B0903020102020204" pitchFamily="34" charset="0"/>
               </a:rPr>
-              <a:t>David  M.</a:t>
+              <a:t>Max</a:t>
             </a:r>
+            <a:endParaRPr lang="en-US" dirty="0" smtClean="0">
+              <a:solidFill>
+                <a:schemeClr val="tx1">
+                  <a:lumMod val="85000"/>
+                  <a:lumOff val="15000"/>
+                </a:schemeClr>
+              </a:solidFill>
+              <a:latin typeface="Franklin Gothic Heavy" panose="020B0903020102020204" pitchFamily="34" charset="0"/>
+            </a:endParaRPr>
           </a:p>
           <a:p>
             <a:r>
@@ -6630,7 +6639,7 @@
           <a:graphicData uri="http://schemas.openxmlformats.org/presentationml/2006/ole">
             <mc:AlternateContent xmlns:mc="http://schemas.openxmlformats.org/markup-compatibility/2006">
               <mc:Choice xmlns:v="urn:schemas-microsoft-com:vml" Requires="v">
-                <p:oleObj spid="_x0000_s2062" name="think-cell Folie" r:id="rId5" imgW="270" imgH="270" progId="TCLayout.ActiveDocument.1">
+                <p:oleObj spid="_x0000_s2063" name="think-cell Folie" r:id="rId5" imgW="270" imgH="270" progId="TCLayout.ActiveDocument.1">
                   <p:embed/>
                 </p:oleObj>
               </mc:Choice>

</xml_diff>

<commit_message>
comments on slide 4
</commit_message>
<xml_diff>
--- a/2ndpresentation.pptx
+++ b/2ndpresentation.pptx
@@ -915,7 +915,36 @@
           <a:p>
             <a:r>
               <a:rPr lang="en-US" dirty="0" smtClean="0"/>
-              <a:t>Change the “XX” with number, and also the “literature review” and “report” if necessary. This slide shows what we have so far</a:t>
+              <a:t>Change the “XX” with number, and also the “literature review” and “report” if necessary. This slide shows what we have so </a:t>
+            </a:r>
+            <a:r>
+              <a:rPr lang="en-US" dirty="0" smtClean="0"/>
+              <a:t>far</a:t>
+            </a:r>
+          </a:p>
+          <a:p>
+            <a:endParaRPr lang="en-US" dirty="0" smtClean="0"/>
+          </a:p>
+          <a:p>
+            <a:r>
+              <a:rPr lang="en-US" dirty="0" smtClean="0"/>
+              <a:t>Maybe a </a:t>
+            </a:r>
+            <a:r>
+              <a:rPr lang="en-US" dirty="0" err="1" smtClean="0"/>
+              <a:t>git</a:t>
+            </a:r>
+            <a:r>
+              <a:rPr lang="en-US" dirty="0" smtClean="0"/>
+              <a:t> screenshot</a:t>
+            </a:r>
+            <a:r>
+              <a:rPr lang="en-US" baseline="0" dirty="0" smtClean="0"/>
+              <a:t> would be nice to see our </a:t>
+            </a:r>
+            <a:r>
+              <a:rPr lang="en-US" baseline="0" smtClean="0"/>
+              <a:t>constant progress</a:t>
             </a:r>
             <a:endParaRPr lang="en-US" dirty="0"/>
           </a:p>
@@ -3756,7 +3785,7 @@
           <a:graphicData uri="http://schemas.openxmlformats.org/presentationml/2006/ole">
             <mc:AlternateContent xmlns:mc="http://schemas.openxmlformats.org/markup-compatibility/2006">
               <mc:Choice xmlns:v="urn:schemas-microsoft-com:vml" Requires="v">
-                <p:oleObj spid="_x0000_s1036" name="think-cell Folie" r:id="rId13" imgW="270" imgH="270" progId="TCLayout.ActiveDocument.1">
+                <p:oleObj spid="_x0000_s1039" name="think-cell Folie" r:id="rId13" imgW="270" imgH="270" progId="TCLayout.ActiveDocument.1">
                   <p:embed/>
                 </p:oleObj>
               </mc:Choice>
@@ -5562,8 +5591,17 @@
                 </a:solidFill>
                 <a:latin typeface="Franklin Gothic Heavy" panose="020B0903020102020204" pitchFamily="34" charset="0"/>
               </a:rPr>
-              <a:t>Mathias</a:t>
+              <a:t>Matthias</a:t>
             </a:r>
+            <a:endParaRPr lang="en-US" dirty="0" smtClean="0">
+              <a:solidFill>
+                <a:schemeClr val="tx1">
+                  <a:lumMod val="85000"/>
+                  <a:lumOff val="15000"/>
+                </a:schemeClr>
+              </a:solidFill>
+              <a:latin typeface="Franklin Gothic Heavy" panose="020B0903020102020204" pitchFamily="34" charset="0"/>
+            </a:endParaRPr>
           </a:p>
           <a:p>
             <a:r>
@@ -6639,7 +6677,7 @@
           <a:graphicData uri="http://schemas.openxmlformats.org/presentationml/2006/ole">
             <mc:AlternateContent xmlns:mc="http://schemas.openxmlformats.org/markup-compatibility/2006">
               <mc:Choice xmlns:v="urn:schemas-microsoft-com:vml" Requires="v">
-                <p:oleObj spid="_x0000_s2063" name="think-cell Folie" r:id="rId5" imgW="270" imgH="270" progId="TCLayout.ActiveDocument.1">
+                <p:oleObj spid="_x0000_s2066" name="think-cell Folie" r:id="rId5" imgW="270" imgH="270" progId="TCLayout.ActiveDocument.1">
                   <p:embed/>
                 </p:oleObj>
               </mc:Choice>

</xml_diff>